<commit_message>
cleaned code to CamelCase
</commit_message>
<xml_diff>
--- a/Dokumente/Pitch_DiceLucky.pptx
+++ b/Dokumente/Pitch_DiceLucky.pptx
@@ -105,6 +105,11 @@
       </a:defRPr>
     </a:lvl9pPr>
   </p:defaultTextStyle>
+  <p:extLst>
+    <p:ext uri="{EFAFB233-063F-42B5-8137-9DF3F51BA10A}">
+      <p15:sldGuideLst xmlns:p15="http://schemas.microsoft.com/office/powerpoint/2012/main"/>
+    </p:ext>
+  </p:extLst>
 </p:presentation>
 </file>
 
@@ -257,7 +262,7 @@
           <a:p>
             <a:fld id="{0F78AC59-023E-4E51-B2EB-0BFFA01D2689}" type="datetimeFigureOut">
               <a:rPr lang="de-CH" smtClean="0"/>
-              <a:t>25.03.2024</a:t>
+              <a:t>26.03.2024</a:t>
             </a:fld>
             <a:endParaRPr lang="de-CH"/>
           </a:p>
@@ -457,7 +462,7 @@
           <a:p>
             <a:fld id="{0F78AC59-023E-4E51-B2EB-0BFFA01D2689}" type="datetimeFigureOut">
               <a:rPr lang="de-CH" smtClean="0"/>
-              <a:t>25.03.2024</a:t>
+              <a:t>26.03.2024</a:t>
             </a:fld>
             <a:endParaRPr lang="de-CH"/>
           </a:p>
@@ -667,7 +672,7 @@
           <a:p>
             <a:fld id="{0F78AC59-023E-4E51-B2EB-0BFFA01D2689}" type="datetimeFigureOut">
               <a:rPr lang="de-CH" smtClean="0"/>
-              <a:t>25.03.2024</a:t>
+              <a:t>26.03.2024</a:t>
             </a:fld>
             <a:endParaRPr lang="de-CH"/>
           </a:p>
@@ -867,7 +872,7 @@
           <a:p>
             <a:fld id="{0F78AC59-023E-4E51-B2EB-0BFFA01D2689}" type="datetimeFigureOut">
               <a:rPr lang="de-CH" smtClean="0"/>
-              <a:t>25.03.2024</a:t>
+              <a:t>26.03.2024</a:t>
             </a:fld>
             <a:endParaRPr lang="de-CH"/>
           </a:p>
@@ -1143,7 +1148,7 @@
           <a:p>
             <a:fld id="{0F78AC59-023E-4E51-B2EB-0BFFA01D2689}" type="datetimeFigureOut">
               <a:rPr lang="de-CH" smtClean="0"/>
-              <a:t>25.03.2024</a:t>
+              <a:t>26.03.2024</a:t>
             </a:fld>
             <a:endParaRPr lang="de-CH"/>
           </a:p>
@@ -1411,7 +1416,7 @@
           <a:p>
             <a:fld id="{0F78AC59-023E-4E51-B2EB-0BFFA01D2689}" type="datetimeFigureOut">
               <a:rPr lang="de-CH" smtClean="0"/>
-              <a:t>25.03.2024</a:t>
+              <a:t>26.03.2024</a:t>
             </a:fld>
             <a:endParaRPr lang="de-CH"/>
           </a:p>
@@ -1826,7 +1831,7 @@
           <a:p>
             <a:fld id="{0F78AC59-023E-4E51-B2EB-0BFFA01D2689}" type="datetimeFigureOut">
               <a:rPr lang="de-CH" smtClean="0"/>
-              <a:t>25.03.2024</a:t>
+              <a:t>26.03.2024</a:t>
             </a:fld>
             <a:endParaRPr lang="de-CH"/>
           </a:p>
@@ -1968,7 +1973,7 @@
           <a:p>
             <a:fld id="{0F78AC59-023E-4E51-B2EB-0BFFA01D2689}" type="datetimeFigureOut">
               <a:rPr lang="de-CH" smtClean="0"/>
-              <a:t>25.03.2024</a:t>
+              <a:t>26.03.2024</a:t>
             </a:fld>
             <a:endParaRPr lang="de-CH"/>
           </a:p>
@@ -2081,7 +2086,7 @@
           <a:p>
             <a:fld id="{0F78AC59-023E-4E51-B2EB-0BFFA01D2689}" type="datetimeFigureOut">
               <a:rPr lang="de-CH" smtClean="0"/>
-              <a:t>25.03.2024</a:t>
+              <a:t>26.03.2024</a:t>
             </a:fld>
             <a:endParaRPr lang="de-CH"/>
           </a:p>
@@ -2394,7 +2399,7 @@
           <a:p>
             <a:fld id="{0F78AC59-023E-4E51-B2EB-0BFFA01D2689}" type="datetimeFigureOut">
               <a:rPr lang="de-CH" smtClean="0"/>
-              <a:t>25.03.2024</a:t>
+              <a:t>26.03.2024</a:t>
             </a:fld>
             <a:endParaRPr lang="de-CH"/>
           </a:p>
@@ -2683,7 +2688,7 @@
           <a:p>
             <a:fld id="{0F78AC59-023E-4E51-B2EB-0BFFA01D2689}" type="datetimeFigureOut">
               <a:rPr lang="de-CH" smtClean="0"/>
-              <a:t>25.03.2024</a:t>
+              <a:t>26.03.2024</a:t>
             </a:fld>
             <a:endParaRPr lang="de-CH"/>
           </a:p>
@@ -2926,7 +2931,7 @@
           <a:p>
             <a:fld id="{0F78AC59-023E-4E51-B2EB-0BFFA01D2689}" type="datetimeFigureOut">
               <a:rPr lang="de-CH" smtClean="0"/>
-              <a:t>25.03.2024</a:t>
+              <a:t>26.03.2024</a:t>
             </a:fld>
             <a:endParaRPr lang="de-CH"/>
           </a:p>
@@ -3899,7 +3904,7 @@
         </p:nvSpPr>
         <p:spPr>
           <a:xfrm>
-            <a:off x="4162567" y="818984"/>
+            <a:off x="3279972" y="818985"/>
             <a:ext cx="6714699" cy="3178689"/>
           </a:xfrm>
         </p:spPr>
@@ -3911,13 +3916,26 @@
           <a:p>
             <a:pPr algn="l"/>
             <a:r>
-              <a:rPr lang="de-CH" sz="4800">
+              <a:rPr lang="de-CH" sz="4800" dirty="0">
+                <a:solidFill>
+                  <a:srgbClr val="FFFFFF"/>
+                </a:solidFill>
+              </a:rPr>
+              <a:t>Pitch </a:t>
+            </a:r>
+            <a:r>
+              <a:rPr lang="de-CH" sz="4800" dirty="0" err="1">
                 <a:solidFill>
                   <a:srgbClr val="FFFFFF"/>
                 </a:solidFill>
               </a:rPr>
               <a:t>DiceLucky</a:t>
             </a:r>
+            <a:endParaRPr lang="de-CH" sz="4800" dirty="0">
+              <a:solidFill>
+                <a:srgbClr val="FFFFFF"/>
+              </a:solidFill>
+            </a:endParaRPr>
           </a:p>
         </p:txBody>
       </p:sp>
@@ -4027,7 +4045,7 @@
           <a:p>
             <a:pPr algn="l"/>
             <a:r>
-              <a:rPr lang="de-CH">
+              <a:rPr lang="de-CH" dirty="0">
                 <a:solidFill>
                   <a:srgbClr val="FFFFFF"/>
                 </a:solidFill>
@@ -4584,8 +4602,8 @@
         </p:nvSpPr>
         <p:spPr>
           <a:xfrm>
-            <a:off x="6479458" y="481781"/>
-            <a:ext cx="4886147" cy="5874569"/>
+            <a:off x="6479458" y="481780"/>
+            <a:ext cx="4886147" cy="7087861"/>
           </a:xfrm>
         </p:spPr>
         <p:txBody>
@@ -4599,8 +4617,94 @@
                 <a:latin typeface="Arial" panose="020B0604020202020204" pitchFamily="34" charset="0"/>
                 <a:cs typeface="Arial" panose="020B0604020202020204" pitchFamily="34" charset="0"/>
               </a:rPr>
-              <a:t>Nervenkitzel</a:t>
-            </a:r>
+              <a:t>Beschreibung</a:t>
+            </a:r>
+          </a:p>
+          <a:p>
+            <a:pPr lvl="1"/>
+            <a:r>
+              <a:rPr lang="de-CH" sz="1300" dirty="0" err="1">
+                <a:latin typeface="Arial" panose="020B0604020202020204" pitchFamily="34" charset="0"/>
+                <a:cs typeface="Arial" panose="020B0604020202020204" pitchFamily="34" charset="0"/>
+              </a:rPr>
+              <a:t>Dicen</a:t>
+            </a:r>
+            <a:r>
+              <a:rPr lang="de-CH" sz="1300" dirty="0">
+                <a:latin typeface="Arial" panose="020B0604020202020204" pitchFamily="34" charset="0"/>
+                <a:cs typeface="Arial" panose="020B0604020202020204" pitchFamily="34" charset="0"/>
+              </a:rPr>
+              <a:t> durch schütteln</a:t>
+            </a:r>
+          </a:p>
+          <a:p>
+            <a:pPr lvl="1"/>
+            <a:r>
+              <a:rPr lang="de-CH" sz="1300" dirty="0" err="1">
+                <a:latin typeface="Arial" panose="020B0604020202020204" pitchFamily="34" charset="0"/>
+                <a:cs typeface="Arial" panose="020B0604020202020204" pitchFamily="34" charset="0"/>
+              </a:rPr>
+              <a:t>Dicen</a:t>
+            </a:r>
+            <a:r>
+              <a:rPr lang="de-CH" sz="1300" dirty="0">
+                <a:latin typeface="Arial" panose="020B0604020202020204" pitchFamily="34" charset="0"/>
+                <a:cs typeface="Arial" panose="020B0604020202020204" pitchFamily="34" charset="0"/>
+              </a:rPr>
+              <a:t> durch kopfdrücken</a:t>
+            </a:r>
+          </a:p>
+          <a:p>
+            <a:pPr lvl="1"/>
+            <a:r>
+              <a:rPr lang="de-CH" sz="1300" dirty="0">
+                <a:latin typeface="Arial" panose="020B0604020202020204" pitchFamily="34" charset="0"/>
+                <a:cs typeface="Arial" panose="020B0604020202020204" pitchFamily="34" charset="0"/>
+              </a:rPr>
+              <a:t>Bei </a:t>
+            </a:r>
+            <a:r>
+              <a:rPr lang="de-CH" sz="1300" dirty="0" err="1">
+                <a:latin typeface="Arial" panose="020B0604020202020204" pitchFamily="34" charset="0"/>
+                <a:cs typeface="Arial" panose="020B0604020202020204" pitchFamily="34" charset="0"/>
+              </a:rPr>
+              <a:t>Win</a:t>
+            </a:r>
+            <a:r>
+              <a:rPr lang="de-CH" sz="1300" dirty="0">
+                <a:latin typeface="Arial" panose="020B0604020202020204" pitchFamily="34" charset="0"/>
+                <a:cs typeface="Arial" panose="020B0604020202020204" pitchFamily="34" charset="0"/>
+              </a:rPr>
+              <a:t> ein Vibrieren</a:t>
+            </a:r>
+          </a:p>
+          <a:p>
+            <a:pPr lvl="1"/>
+            <a:r>
+              <a:rPr lang="de-CH" sz="1300" dirty="0">
+                <a:latin typeface="Arial" panose="020B0604020202020204" pitchFamily="34" charset="0"/>
+                <a:cs typeface="Arial" panose="020B0604020202020204" pitchFamily="34" charset="0"/>
+              </a:rPr>
+              <a:t>Jede Stunde 20 plus </a:t>
+            </a:r>
+            <a:r>
+              <a:rPr lang="de-CH" sz="1300" dirty="0" err="1">
+                <a:latin typeface="Arial" panose="020B0604020202020204" pitchFamily="34" charset="0"/>
+                <a:cs typeface="Arial" panose="020B0604020202020204" pitchFamily="34" charset="0"/>
+              </a:rPr>
+              <a:t>Coins</a:t>
+            </a:r>
+            <a:endParaRPr lang="de-CH" sz="1300" dirty="0">
+              <a:latin typeface="Arial" panose="020B0604020202020204" pitchFamily="34" charset="0"/>
+              <a:cs typeface="Arial" panose="020B0604020202020204" pitchFamily="34" charset="0"/>
+            </a:endParaRPr>
+          </a:p>
+          <a:p>
+            <a:pPr lvl="1"/>
+            <a:endParaRPr lang="de-CH" sz="1300" b="1" dirty="0">
+              <a:latin typeface="Arial" panose="020B0604020202020204" pitchFamily="34" charset="0"/>
+              <a:cs typeface="Arial" panose="020B0604020202020204" pitchFamily="34" charset="0"/>
+            </a:endParaRPr>
           </a:p>
           <a:p>
             <a:r>
@@ -4771,7 +4875,7 @@
                                         <p:tgtEl>
                                           <p:spTgt spid="3">
                                             <p:txEl>
-                                              <p:pRg st="0" end="0"/>
+                                              <p:pRg st="6" end="6"/>
                                             </p:txEl>
                                           </p:spTgt>
                                         </p:tgtEl>
@@ -4820,7 +4924,7 @@
                                         <p:tgtEl>
                                           <p:spTgt spid="3">
                                             <p:txEl>
-                                              <p:pRg st="1" end="1"/>
+                                              <p:pRg st="0" end="0"/>
                                             </p:txEl>
                                           </p:spTgt>
                                         </p:tgtEl>
@@ -4869,7 +4973,7 @@
                                         <p:tgtEl>
                                           <p:spTgt spid="3">
                                             <p:txEl>
-                                              <p:pRg st="2" end="2"/>
+                                              <p:pRg st="1" end="1"/>
                                             </p:txEl>
                                           </p:spTgt>
                                         </p:tgtEl>
@@ -4918,7 +5022,7 @@
                                         <p:tgtEl>
                                           <p:spTgt spid="3">
                                             <p:txEl>
-                                              <p:pRg st="3" end="3"/>
+                                              <p:pRg st="2" end="2"/>
                                             </p:txEl>
                                           </p:spTgt>
                                         </p:tgtEl>
@@ -4967,7 +5071,7 @@
                                         <p:tgtEl>
                                           <p:spTgt spid="3">
                                             <p:txEl>
-                                              <p:pRg st="4" end="4"/>
+                                              <p:pRg st="3" end="3"/>
                                             </p:txEl>
                                           </p:spTgt>
                                         </p:tgtEl>
@@ -5016,7 +5120,7 @@
                                         <p:tgtEl>
                                           <p:spTgt spid="3">
                                             <p:txEl>
-                                              <p:pRg st="5" end="5"/>
+                                              <p:pRg st="4" end="4"/>
                                             </p:txEl>
                                           </p:spTgt>
                                         </p:tgtEl>
@@ -5065,7 +5169,7 @@
                                         <p:tgtEl>
                                           <p:spTgt spid="3">
                                             <p:txEl>
-                                              <p:pRg st="6" end="6"/>
+                                              <p:pRg st="7" end="7"/>
                                             </p:txEl>
                                           </p:spTgt>
                                         </p:tgtEl>
@@ -5114,7 +5218,7 @@
                                         <p:tgtEl>
                                           <p:spTgt spid="3">
                                             <p:txEl>
-                                              <p:pRg st="7" end="7"/>
+                                              <p:pRg st="8" end="8"/>
                                             </p:txEl>
                                           </p:spTgt>
                                         </p:tgtEl>
@@ -5163,7 +5267,203 @@
                                         <p:tgtEl>
                                           <p:spTgt spid="3">
                                             <p:txEl>
-                                              <p:pRg st="8" end="8"/>
+                                              <p:pRg st="9" end="9"/>
+                                            </p:txEl>
+                                          </p:spTgt>
+                                        </p:tgtEl>
+                                        <p:attrNameLst>
+                                          <p:attrName>style.visibility</p:attrName>
+                                        </p:attrNameLst>
+                                      </p:cBhvr>
+                                      <p:to>
+                                        <p:strVal val="visible"/>
+                                      </p:to>
+                                    </p:set>
+                                  </p:childTnLst>
+                                </p:cTn>
+                              </p:par>
+                            </p:childTnLst>
+                          </p:cTn>
+                        </p:par>
+                      </p:childTnLst>
+                    </p:cTn>
+                  </p:par>
+                  <p:par>
+                    <p:cTn id="39" fill="hold">
+                      <p:stCondLst>
+                        <p:cond delay="indefinite"/>
+                      </p:stCondLst>
+                      <p:childTnLst>
+                        <p:par>
+                          <p:cTn id="40" fill="hold">
+                            <p:stCondLst>
+                              <p:cond delay="0"/>
+                            </p:stCondLst>
+                            <p:childTnLst>
+                              <p:par>
+                                <p:cTn id="41" presetID="1" presetClass="entr" presetSubtype="0" fill="hold" nodeType="clickEffect">
+                                  <p:stCondLst>
+                                    <p:cond delay="0"/>
+                                  </p:stCondLst>
+                                  <p:childTnLst>
+                                    <p:set>
+                                      <p:cBhvr>
+                                        <p:cTn id="42" dur="1" fill="hold">
+                                          <p:stCondLst>
+                                            <p:cond delay="0"/>
+                                          </p:stCondLst>
+                                        </p:cTn>
+                                        <p:tgtEl>
+                                          <p:spTgt spid="3">
+                                            <p:txEl>
+                                              <p:pRg st="10" end="10"/>
+                                            </p:txEl>
+                                          </p:spTgt>
+                                        </p:tgtEl>
+                                        <p:attrNameLst>
+                                          <p:attrName>style.visibility</p:attrName>
+                                        </p:attrNameLst>
+                                      </p:cBhvr>
+                                      <p:to>
+                                        <p:strVal val="visible"/>
+                                      </p:to>
+                                    </p:set>
+                                  </p:childTnLst>
+                                </p:cTn>
+                              </p:par>
+                            </p:childTnLst>
+                          </p:cTn>
+                        </p:par>
+                      </p:childTnLst>
+                    </p:cTn>
+                  </p:par>
+                  <p:par>
+                    <p:cTn id="43" fill="hold">
+                      <p:stCondLst>
+                        <p:cond delay="indefinite"/>
+                      </p:stCondLst>
+                      <p:childTnLst>
+                        <p:par>
+                          <p:cTn id="44" fill="hold">
+                            <p:stCondLst>
+                              <p:cond delay="0"/>
+                            </p:stCondLst>
+                            <p:childTnLst>
+                              <p:par>
+                                <p:cTn id="45" presetID="1" presetClass="entr" presetSubtype="0" fill="hold" nodeType="clickEffect">
+                                  <p:stCondLst>
+                                    <p:cond delay="0"/>
+                                  </p:stCondLst>
+                                  <p:childTnLst>
+                                    <p:set>
+                                      <p:cBhvr>
+                                        <p:cTn id="46" dur="1" fill="hold">
+                                          <p:stCondLst>
+                                            <p:cond delay="0"/>
+                                          </p:stCondLst>
+                                        </p:cTn>
+                                        <p:tgtEl>
+                                          <p:spTgt spid="3">
+                                            <p:txEl>
+                                              <p:pRg st="11" end="11"/>
+                                            </p:txEl>
+                                          </p:spTgt>
+                                        </p:tgtEl>
+                                        <p:attrNameLst>
+                                          <p:attrName>style.visibility</p:attrName>
+                                        </p:attrNameLst>
+                                      </p:cBhvr>
+                                      <p:to>
+                                        <p:strVal val="visible"/>
+                                      </p:to>
+                                    </p:set>
+                                  </p:childTnLst>
+                                </p:cTn>
+                              </p:par>
+                            </p:childTnLst>
+                          </p:cTn>
+                        </p:par>
+                      </p:childTnLst>
+                    </p:cTn>
+                  </p:par>
+                  <p:par>
+                    <p:cTn id="47" fill="hold">
+                      <p:stCondLst>
+                        <p:cond delay="indefinite"/>
+                      </p:stCondLst>
+                      <p:childTnLst>
+                        <p:par>
+                          <p:cTn id="48" fill="hold">
+                            <p:stCondLst>
+                              <p:cond delay="0"/>
+                            </p:stCondLst>
+                            <p:childTnLst>
+                              <p:par>
+                                <p:cTn id="49" presetID="1" presetClass="entr" presetSubtype="0" fill="hold" nodeType="clickEffect">
+                                  <p:stCondLst>
+                                    <p:cond delay="0"/>
+                                  </p:stCondLst>
+                                  <p:childTnLst>
+                                    <p:set>
+                                      <p:cBhvr>
+                                        <p:cTn id="50" dur="1" fill="hold">
+                                          <p:stCondLst>
+                                            <p:cond delay="0"/>
+                                          </p:stCondLst>
+                                        </p:cTn>
+                                        <p:tgtEl>
+                                          <p:spTgt spid="3">
+                                            <p:txEl>
+                                              <p:pRg st="12" end="12"/>
+                                            </p:txEl>
+                                          </p:spTgt>
+                                        </p:tgtEl>
+                                        <p:attrNameLst>
+                                          <p:attrName>style.visibility</p:attrName>
+                                        </p:attrNameLst>
+                                      </p:cBhvr>
+                                      <p:to>
+                                        <p:strVal val="visible"/>
+                                      </p:to>
+                                    </p:set>
+                                  </p:childTnLst>
+                                </p:cTn>
+                              </p:par>
+                            </p:childTnLst>
+                          </p:cTn>
+                        </p:par>
+                      </p:childTnLst>
+                    </p:cTn>
+                  </p:par>
+                  <p:par>
+                    <p:cTn id="51" fill="hold">
+                      <p:stCondLst>
+                        <p:cond delay="indefinite"/>
+                      </p:stCondLst>
+                      <p:childTnLst>
+                        <p:par>
+                          <p:cTn id="52" fill="hold">
+                            <p:stCondLst>
+                              <p:cond delay="0"/>
+                            </p:stCondLst>
+                            <p:childTnLst>
+                              <p:par>
+                                <p:cTn id="53" presetID="1" presetClass="entr" presetSubtype="0" fill="hold" nodeType="clickEffect">
+                                  <p:stCondLst>
+                                    <p:cond delay="0"/>
+                                  </p:stCondLst>
+                                  <p:childTnLst>
+                                    <p:set>
+                                      <p:cBhvr>
+                                        <p:cTn id="54" dur="1" fill="hold">
+                                          <p:stCondLst>
+                                            <p:cond delay="0"/>
+                                          </p:stCondLst>
+                                        </p:cTn>
+                                        <p:tgtEl>
+                                          <p:spTgt spid="3">
+                                            <p:txEl>
+                                              <p:pRg st="13" end="13"/>
                                             </p:txEl>
                                           </p:spTgt>
                                         </p:tgtEl>

</xml_diff>

<commit_message>
Pich update and Technischer Entwurf update
</commit_message>
<xml_diff>
--- a/Dokumente/Pitch_DiceLucky.pptx
+++ b/Dokumente/Pitch_DiceLucky.pptx
@@ -4603,7 +4603,7 @@
         <p:spPr>
           <a:xfrm>
             <a:off x="6479458" y="481780"/>
-            <a:ext cx="4886147" cy="7087861"/>
+            <a:ext cx="4886147" cy="7429768"/>
           </a:xfrm>
         </p:spPr>
         <p:txBody>
@@ -4750,6 +4750,16 @@
                 <a:cs typeface="Arial" panose="020B0604020202020204" pitchFamily="34" charset="0"/>
               </a:rPr>
               <a:t>Spezifisches Icon wird verwendet(1 Punkt)</a:t>
+            </a:r>
+          </a:p>
+          <a:p>
+            <a:pPr lvl="1"/>
+            <a:r>
+              <a:rPr lang="de-CH" sz="1700" dirty="0">
+                <a:latin typeface="Arial" panose="020B0604020202020204" pitchFamily="34" charset="0"/>
+                <a:cs typeface="Arial" panose="020B0604020202020204" pitchFamily="34" charset="0"/>
+              </a:rPr>
+              <a:t>Locale Datenablage(2 Punkte)</a:t>
             </a:r>
           </a:p>
           <a:p>
@@ -5484,6 +5494,55 @@
                       </p:childTnLst>
                     </p:cTn>
                   </p:par>
+                  <p:par>
+                    <p:cTn id="55" fill="hold">
+                      <p:stCondLst>
+                        <p:cond delay="indefinite"/>
+                      </p:stCondLst>
+                      <p:childTnLst>
+                        <p:par>
+                          <p:cTn id="56" fill="hold">
+                            <p:stCondLst>
+                              <p:cond delay="0"/>
+                            </p:stCondLst>
+                            <p:childTnLst>
+                              <p:par>
+                                <p:cTn id="57" presetID="1" presetClass="entr" presetSubtype="0" fill="hold" nodeType="clickEffect">
+                                  <p:stCondLst>
+                                    <p:cond delay="0"/>
+                                  </p:stCondLst>
+                                  <p:childTnLst>
+                                    <p:set>
+                                      <p:cBhvr>
+                                        <p:cTn id="58" dur="1" fill="hold">
+                                          <p:stCondLst>
+                                            <p:cond delay="0"/>
+                                          </p:stCondLst>
+                                        </p:cTn>
+                                        <p:tgtEl>
+                                          <p:spTgt spid="3">
+                                            <p:txEl>
+                                              <p:pRg st="14" end="14"/>
+                                            </p:txEl>
+                                          </p:spTgt>
+                                        </p:tgtEl>
+                                        <p:attrNameLst>
+                                          <p:attrName>style.visibility</p:attrName>
+                                        </p:attrNameLst>
+                                      </p:cBhvr>
+                                      <p:to>
+                                        <p:strVal val="visible"/>
+                                      </p:to>
+                                    </p:set>
+                                  </p:childTnLst>
+                                </p:cTn>
+                              </p:par>
+                            </p:childTnLst>
+                          </p:cTn>
+                        </p:par>
+                      </p:childTnLst>
+                    </p:cTn>
+                  </p:par>
                 </p:childTnLst>
               </p:cTn>
               <p:prevCondLst>

</xml_diff>